<commit_message>
Show Case Error fixes from first session
</commit_message>
<xml_diff>
--- a/JavaFunctionalShowCase.pptx
+++ b/JavaFunctionalShowCase.pptx
@@ -210,7 +210,7 @@
           <a:p>
             <a:fld id="{08B72EBD-4497-4DA1-AE6A-22686FBDA854}" type="datetimeFigureOut">
               <a:rPr lang="en-US" smtClean="0"/>
-              <a:t>11/5/2021</a:t>
+              <a:t>11/6/2021</a:t>
             </a:fld>
             <a:endParaRPr lang="en-US"/>
           </a:p>
@@ -1946,7 +1946,7 @@
           <a:p>
             <a:fld id="{AF0FCD54-9834-4BE8-9B5B-EEF02B5391B3}" type="datetimeFigureOut">
               <a:rPr lang="es-CO" smtClean="0"/>
-              <a:t>5/11/2021</a:t>
+              <a:t>6/11/2021</a:t>
             </a:fld>
             <a:endParaRPr lang="es-CO"/>
           </a:p>
@@ -6407,7 +6407,7 @@
             </a:r>
             <a:r>
               <a:rPr lang="en-US" dirty="0"/>
-              <a:t> / Boolean</a:t>
+              <a:t> / Boolean.</a:t>
             </a:r>
           </a:p>
         </p:txBody>
@@ -6446,7 +6446,7 @@
             </a:r>
             <a:r>
               <a:rPr lang="en-US" b="1" i="1" dirty="0"/>
-              <a:t>&lt;T, U, R&gt; </a:t>
+              <a:t>&lt;T, U&gt; </a:t>
             </a:r>
             <a:r>
               <a:rPr lang="en-US" dirty="0"/>
@@ -6514,7 +6514,15 @@
             </a:r>
             <a:r>
               <a:rPr lang="en-US" dirty="0"/>
-              <a:t> R</a:t>
+              <a:t> </a:t>
+            </a:r>
+            <a:r>
+              <a:rPr lang="en-US" dirty="0" err="1"/>
+              <a:t>lógico</a:t>
+            </a:r>
+            <a:r>
+              <a:rPr lang="en-US" dirty="0"/>
+              <a:t> / Boolean.</a:t>
             </a:r>
           </a:p>
         </p:txBody>
@@ -7654,7 +7662,7 @@
           <a:p>
             <a:r>
               <a:rPr lang="en-US" b="1" i="1" dirty="0"/>
-              <a:t>Supplier&lt;&gt; </a:t>
+              <a:t>Supplier&lt;R&gt; </a:t>
             </a:r>
             <a:r>
               <a:rPr lang="en-US" dirty="0"/>
@@ -7690,7 +7698,15 @@
             </a:r>
             <a:r>
               <a:rPr lang="en-US" dirty="0"/>
-              <a:t> libre.</a:t>
+              <a:t> libre de </a:t>
+            </a:r>
+            <a:r>
+              <a:rPr lang="en-US" dirty="0" err="1"/>
+              <a:t>tipo</a:t>
+            </a:r>
+            <a:r>
+              <a:rPr lang="en-US" dirty="0"/>
+              <a:t> R.</a:t>
             </a:r>
           </a:p>
         </p:txBody>

</xml_diff>